<commit_message>
Add exercise and solution for PHP greeting
Added 'Opgave.md' for the first exercise on dynamic greetings based on time, including a challenge to display user IP and date. Moved solution files to the corresponding exercise folder and updated the presentation and README with debugging tips.
</commit_message>
<xml_diff>
--- a/Hoofdstuk 1 - Intro/Webdesign PHP - H1 Intro.pptx
+++ b/Hoofdstuk 1 - Intro/Webdesign PHP - H1 Intro.pptx
@@ -5,7 +5,7 @@
     <p:sldMasterId id="2147483696" r:id="rId1"/>
   </p:sldMasterIdLst>
   <p:notesMasterIdLst>
-    <p:notesMasterId r:id="rId28"/>
+    <p:notesMasterId r:id="rId29"/>
   </p:notesMasterIdLst>
   <p:sldIdLst>
     <p:sldId id="256" r:id="rId2"/>
@@ -32,8 +32,9 @@
     <p:sldId id="269" r:id="rId23"/>
     <p:sldId id="266" r:id="rId24"/>
     <p:sldId id="280" r:id="rId25"/>
-    <p:sldId id="272" r:id="rId26"/>
-    <p:sldId id="270" r:id="rId27"/>
+    <p:sldId id="283" r:id="rId26"/>
+    <p:sldId id="272" r:id="rId27"/>
+    <p:sldId id="270" r:id="rId28"/>
   </p:sldIdLst>
   <p:sldSz cx="12192000" cy="6858000"/>
   <p:notesSz cx="6858000" cy="9144000"/>
@@ -144,6 +145,7 @@
 <p1510:revInfo xmlns:a="http://schemas.openxmlformats.org/drawingml/2006/main" xmlns:r="http://schemas.openxmlformats.org/officeDocument/2006/relationships" xmlns:p1510="http://schemas.microsoft.com/office/powerpoint/2015/10/main">
   <p1510:revLst>
     <p1510:client id="{088DB199-2772-FF9B-D198-B0F0AED6E850}" v="2834" dt="2025-10-16T19:00:53.124"/>
+    <p1510:client id="{BE6DD00A-6151-D2F7-CF87-7F49A8C318AC}" v="141" dt="2025-10-16T19:46:49.120"/>
   </p1510:revLst>
 </p1510:revInfo>
 </file>
@@ -5830,7 +5832,7 @@
           <a:p>
             <a:fld id="{39DBD449-D42A-4711-8837-53EC15580D9C}" type="slidenum">
               <a:rPr lang="nl-BE" smtClean="0"/>
-              <a:t>8</a:t>
+              <a:t>10</a:t>
             </a:fld>
             <a:endParaRPr lang="nl-BE"/>
           </a:p>
@@ -5974,7 +5976,7 @@
           <a:p>
             <a:fld id="{39DBD449-D42A-4711-8837-53EC15580D9C}" type="slidenum">
               <a:rPr lang="nl-BE" smtClean="0"/>
-              <a:t>9</a:t>
+              <a:t>11</a:t>
             </a:fld>
             <a:endParaRPr lang="nl-BE"/>
           </a:p>
@@ -6238,7 +6240,7 @@
           <a:p>
             <a:fld id="{39DBD449-D42A-4711-8837-53EC15580D9C}" type="slidenum">
               <a:rPr lang="nl-BE" smtClean="0"/>
-              <a:t>10</a:t>
+              <a:t>13</a:t>
             </a:fld>
             <a:endParaRPr lang="nl-BE"/>
           </a:p>
@@ -6367,7 +6369,7 @@
           <a:p>
             <a:fld id="{39DBD449-D42A-4711-8837-53EC15580D9C}" type="slidenum">
               <a:rPr lang="nl-BE" smtClean="0"/>
-              <a:t>11</a:t>
+              <a:t>14</a:t>
             </a:fld>
             <a:endParaRPr lang="nl-BE"/>
           </a:p>
@@ -6583,7 +6585,7 @@
           <a:p>
             <a:fld id="{39DBD449-D42A-4711-8837-53EC15580D9C}" type="slidenum">
               <a:rPr lang="nl-BE" smtClean="0"/>
-              <a:t>14</a:t>
+              <a:t>16</a:t>
             </a:fld>
             <a:endParaRPr lang="nl-BE"/>
           </a:p>
@@ -6691,7 +6693,7 @@
           <a:p>
             <a:fld id="{39DBD449-D42A-4711-8837-53EC15580D9C}" type="slidenum">
               <a:rPr lang="nl-BE" smtClean="0"/>
-              <a:t>16</a:t>
+              <a:t>17</a:t>
             </a:fld>
             <a:endParaRPr lang="nl-BE"/>
           </a:p>
@@ -6799,7 +6801,7 @@
           <a:p>
             <a:fld id="{39DBD449-D42A-4711-8837-53EC15580D9C}" type="slidenum">
               <a:rPr lang="nl-BE" smtClean="0"/>
-              <a:t>17</a:t>
+              <a:t>18</a:t>
             </a:fld>
             <a:endParaRPr lang="nl-BE"/>
           </a:p>
@@ -6935,7 +6937,7 @@
           <a:p>
             <a:fld id="{39DBD449-D42A-4711-8837-53EC15580D9C}" type="slidenum">
               <a:rPr lang="nl-BE" smtClean="0"/>
-              <a:t>18</a:t>
+              <a:t>19</a:t>
             </a:fld>
             <a:endParaRPr lang="nl-BE"/>
           </a:p>
@@ -7360,7 +7362,7 @@
           <a:p>
             <a:fld id="{39DBD449-D42A-4711-8837-53EC15580D9C}" type="slidenum">
               <a:rPr lang="nl-BE" smtClean="0"/>
-              <a:t>12</a:t>
+              <a:t>21</a:t>
             </a:fld>
             <a:endParaRPr lang="nl-BE"/>
           </a:p>
@@ -7500,7 +7502,7 @@
           <a:p>
             <a:fld id="{39DBD449-D42A-4711-8837-53EC15580D9C}" type="slidenum">
               <a:rPr lang="nl-BE" smtClean="0"/>
-              <a:t>13</a:t>
+              <a:t>22</a:t>
             </a:fld>
             <a:endParaRPr lang="nl-BE"/>
           </a:p>
@@ -7608,7 +7610,7 @@
           <a:p>
             <a:fld id="{39DBD449-D42A-4711-8837-53EC15580D9C}" type="slidenum">
               <a:rPr lang="nl-BE" smtClean="0"/>
-              <a:t>14</a:t>
+              <a:t>23</a:t>
             </a:fld>
             <a:endParaRPr lang="nl-BE"/>
           </a:p>
@@ -7736,7 +7738,7 @@
           <a:p>
             <a:fld id="{39DBD449-D42A-4711-8837-53EC15580D9C}" type="slidenum">
               <a:rPr lang="nl-BE" smtClean="0"/>
-              <a:t>22</a:t>
+              <a:t>24</a:t>
             </a:fld>
             <a:endParaRPr lang="nl-BE"/>
           </a:p>
@@ -7756,6 +7758,134 @@
 </file>
 
 <file path=ppt/notesSlides/notesSlide25.xml><?xml version="1.0" encoding="utf-8"?>
+<p:notes xmlns:a="http://schemas.openxmlformats.org/drawingml/2006/main" xmlns:r="http://schemas.openxmlformats.org/officeDocument/2006/relationships" xmlns:p="http://schemas.openxmlformats.org/presentationml/2006/main">
+  <p:cSld>
+    <p:spTree>
+      <p:nvGrpSpPr>
+        <p:cNvPr id="1" name="">
+          <a:extLst>
+            <a:ext uri="{FF2B5EF4-FFF2-40B4-BE49-F238E27FC236}">
+              <a16:creationId xmlns:a16="http://schemas.microsoft.com/office/drawing/2014/main" id="{729F6857-375D-4076-9F9F-1D684597CEBB}"/>
+            </a:ext>
+          </a:extLst>
+        </p:cNvPr>
+        <p:cNvGrpSpPr/>
+        <p:nvPr/>
+      </p:nvGrpSpPr>
+      <p:grpSpPr>
+        <a:xfrm>
+          <a:off x="0" y="0"/>
+          <a:ext cx="0" cy="0"/>
+          <a:chOff x="0" y="0"/>
+          <a:chExt cx="0" cy="0"/>
+        </a:xfrm>
+      </p:grpSpPr>
+      <p:sp>
+        <p:nvSpPr>
+          <p:cNvPr id="2" name="Tijdelijke aanduiding voor dia-afbeelding 1">
+            <a:extLst>
+              <a:ext uri="{FF2B5EF4-FFF2-40B4-BE49-F238E27FC236}">
+                <a16:creationId xmlns:a16="http://schemas.microsoft.com/office/drawing/2014/main" id="{B4EE345F-AD4E-A968-F48E-D98DF59AD120}"/>
+              </a:ext>
+            </a:extLst>
+          </p:cNvPr>
+          <p:cNvSpPr>
+            <a:spLocks noGrp="1" noRot="1" noChangeAspect="1"/>
+          </p:cNvSpPr>
+          <p:nvPr>
+            <p:ph type="sldImg"/>
+          </p:nvPr>
+        </p:nvSpPr>
+        <p:spPr/>
+      </p:sp>
+      <p:sp>
+        <p:nvSpPr>
+          <p:cNvPr id="3" name="Tijdelijke aanduiding voor notities 2">
+            <a:extLst>
+              <a:ext uri="{FF2B5EF4-FFF2-40B4-BE49-F238E27FC236}">
+                <a16:creationId xmlns:a16="http://schemas.microsoft.com/office/drawing/2014/main" id="{E4FBFE37-D2EB-5E5C-A8EA-2EDFD234ACC6}"/>
+              </a:ext>
+            </a:extLst>
+          </p:cNvPr>
+          <p:cNvSpPr>
+            <a:spLocks noGrp="1"/>
+          </p:cNvSpPr>
+          <p:nvPr>
+            <p:ph type="body" idx="1"/>
+          </p:nvPr>
+        </p:nvSpPr>
+        <p:spPr/>
+        <p:txBody>
+          <a:bodyPr/>
+          <a:lstStyle/>
+          <a:p>
+            <a:r>
+              <a:rPr lang="nl-BE" dirty="0"/>
+              <a:t>Als je een HTML pagina op een netwerk zet, zoals het internet, dan stuurt je browser een HTTP </a:t>
+            </a:r>
+            <a:r>
+              <a:rPr lang="nl-BE" dirty="0" err="1"/>
+              <a:t>request</a:t>
+            </a:r>
+            <a:r>
+              <a:rPr lang="nl-BE" dirty="0"/>
+              <a:t>. Op het netwerk krijg je dan een antwoord terug, dat is de HTTP response.</a:t>
+            </a:r>
+          </a:p>
+          <a:p>
+            <a:endParaRPr lang="nl-BE" dirty="0"/>
+          </a:p>
+          <a:p>
+            <a:r>
+              <a:rPr lang="nl-BE" dirty="0"/>
+              <a:t>Je moet PHP zien als een instantie dat zich ertussen injecteert. Zelfs als je PHP gebruikt, krijgt je browser gewoon een HTTP response terug.</a:t>
+            </a:r>
+          </a:p>
+        </p:txBody>
+      </p:sp>
+      <p:sp>
+        <p:nvSpPr>
+          <p:cNvPr id="4" name="Tijdelijke aanduiding voor dianummer 3">
+            <a:extLst>
+              <a:ext uri="{FF2B5EF4-FFF2-40B4-BE49-F238E27FC236}">
+                <a16:creationId xmlns:a16="http://schemas.microsoft.com/office/drawing/2014/main" id="{C164FE8F-F26A-9C1D-CE08-669EB19DA696}"/>
+              </a:ext>
+            </a:extLst>
+          </p:cNvPr>
+          <p:cNvSpPr>
+            <a:spLocks noGrp="1"/>
+          </p:cNvSpPr>
+          <p:nvPr>
+            <p:ph type="sldNum" sz="quarter" idx="5"/>
+          </p:nvPr>
+        </p:nvSpPr>
+        <p:spPr/>
+        <p:txBody>
+          <a:bodyPr/>
+          <a:lstStyle/>
+          <a:p>
+            <a:fld id="{39DBD449-D42A-4711-8837-53EC15580D9C}" type="slidenum">
+              <a:rPr lang="nl-BE" smtClean="0"/>
+              <a:t>25</a:t>
+            </a:fld>
+            <a:endParaRPr lang="nl-BE"/>
+          </a:p>
+        </p:txBody>
+      </p:sp>
+    </p:spTree>
+    <p:extLst>
+      <p:ext uri="{BB962C8B-B14F-4D97-AF65-F5344CB8AC3E}">
+        <p14:creationId xmlns:p14="http://schemas.microsoft.com/office/powerpoint/2010/main" val="3384121817"/>
+      </p:ext>
+    </p:extLst>
+  </p:cSld>
+  <p:clrMapOvr>
+    <a:masterClrMapping/>
+  </p:clrMapOvr>
+</p:notes>
+</file>
+
+<file path=ppt/notesSlides/notesSlide26.xml><?xml version="1.0" encoding="utf-8"?>
 <p:notes xmlns:a="http://schemas.openxmlformats.org/drawingml/2006/main" xmlns:r="http://schemas.openxmlformats.org/officeDocument/2006/relationships" xmlns:p="http://schemas.openxmlformats.org/presentationml/2006/main">
   <p:cSld>
     <p:spTree>
@@ -7844,7 +7974,7 @@
           <a:p>
             <a:fld id="{39DBD449-D42A-4711-8837-53EC15580D9C}" type="slidenum">
               <a:rPr lang="nl-BE" smtClean="0"/>
-              <a:t>15</a:t>
+              <a:t>25</a:t>
             </a:fld>
             <a:endParaRPr lang="nl-BE"/>
           </a:p>
@@ -7863,7 +7993,7 @@
 </p:notes>
 </file>
 
-<file path=ppt/notesSlides/notesSlide26.xml><?xml version="1.0" encoding="utf-8"?>
+<file path=ppt/notesSlides/notesSlide27.xml><?xml version="1.0" encoding="utf-8"?>
 <p:notes xmlns:a="http://schemas.openxmlformats.org/drawingml/2006/main" xmlns:r="http://schemas.openxmlformats.org/officeDocument/2006/relationships" xmlns:p="http://schemas.openxmlformats.org/presentationml/2006/main">
   <p:cSld>
     <p:spTree>
@@ -7952,7 +8082,7 @@
           <a:p>
             <a:fld id="{39DBD449-D42A-4711-8837-53EC15580D9C}" type="slidenum">
               <a:rPr lang="nl-BE" smtClean="0"/>
-              <a:t>16</a:t>
+              <a:t>26</a:t>
             </a:fld>
             <a:endParaRPr lang="nl-BE"/>
           </a:p>
@@ -8293,7 +8423,7 @@
           <a:p>
             <a:fld id="{39DBD449-D42A-4711-8837-53EC15580D9C}" type="slidenum">
               <a:rPr lang="nl-BE" smtClean="0"/>
-              <a:t>3</a:t>
+              <a:t>4</a:t>
             </a:fld>
             <a:endParaRPr lang="nl-BE"/>
           </a:p>
@@ -8388,7 +8518,7 @@
           <a:p>
             <a:fld id="{39DBD449-D42A-4711-8837-53EC15580D9C}" type="slidenum">
               <a:rPr lang="nl-BE" smtClean="0"/>
-              <a:t>3</a:t>
+              <a:t>5</a:t>
             </a:fld>
             <a:endParaRPr lang="nl-BE"/>
           </a:p>
@@ -8550,7 +8680,7 @@
           <a:p>
             <a:fld id="{39DBD449-D42A-4711-8837-53EC15580D9C}" type="slidenum">
               <a:rPr lang="nl-BE" smtClean="0"/>
-              <a:t>4</a:t>
+              <a:t>6</a:t>
             </a:fld>
             <a:endParaRPr lang="nl-BE"/>
           </a:p>
@@ -8658,7 +8788,7 @@
           <a:p>
             <a:fld id="{39DBD449-D42A-4711-8837-53EC15580D9C}" type="slidenum">
               <a:rPr lang="nl-BE" smtClean="0"/>
-              <a:t>5</a:t>
+              <a:t>7</a:t>
             </a:fld>
             <a:endParaRPr lang="nl-BE"/>
           </a:p>
@@ -8786,7 +8916,7 @@
           <a:p>
             <a:fld id="{39DBD449-D42A-4711-8837-53EC15580D9C}" type="slidenum">
               <a:rPr lang="nl-BE" smtClean="0"/>
-              <a:t>6</a:t>
+              <a:t>8</a:t>
             </a:fld>
             <a:endParaRPr lang="nl-BE"/>
           </a:p>
@@ -8894,7 +9024,7 @@
           <a:p>
             <a:fld id="{39DBD449-D42A-4711-8837-53EC15580D9C}" type="slidenum">
               <a:rPr lang="nl-BE" smtClean="0"/>
-              <a:t>7</a:t>
+              <a:t>9</a:t>
             </a:fld>
             <a:endParaRPr lang="nl-BE"/>
           </a:p>
@@ -17508,6 +17638,261 @@
         <p:cNvPr id="1" name="">
           <a:extLst>
             <a:ext uri="{FF2B5EF4-FFF2-40B4-BE49-F238E27FC236}">
+              <a16:creationId xmlns:a16="http://schemas.microsoft.com/office/drawing/2014/main" id="{71522152-129E-1E67-FA77-9BFC809C8CC0}"/>
+            </a:ext>
+          </a:extLst>
+        </p:cNvPr>
+        <p:cNvGrpSpPr/>
+        <p:nvPr/>
+      </p:nvGrpSpPr>
+      <p:grpSpPr>
+        <a:xfrm>
+          <a:off x="0" y="0"/>
+          <a:ext cx="0" cy="0"/>
+          <a:chOff x="0" y="0"/>
+          <a:chExt cx="0" cy="0"/>
+        </a:xfrm>
+      </p:grpSpPr>
+      <p:sp useBgFill="1">
+        <p:nvSpPr>
+          <p:cNvPr id="13" name="Rectangle 12">
+            <a:extLst>
+              <a:ext uri="{FF2B5EF4-FFF2-40B4-BE49-F238E27FC236}">
+                <a16:creationId xmlns:a16="http://schemas.microsoft.com/office/drawing/2014/main" id="{A7C99C29-15AA-8DCC-582D-549A85DEBE29}"/>
+              </a:ext>
+              <a:ext uri="{C183D7F6-B498-43B3-948B-1728B52AA6E4}">
+                <adec:decorative xmlns:adec="http://schemas.microsoft.com/office/drawing/2017/decorative" val="1"/>
+              </a:ext>
+            </a:extLst>
+          </p:cNvPr>
+          <p:cNvSpPr>
+            <a:spLocks noGrp="1" noRot="1" noChangeAspect="1" noMove="1" noResize="1" noEditPoints="1" noAdjustHandles="1" noChangeArrowheads="1" noChangeShapeType="1" noTextEdit="1"/>
+          </p:cNvSpPr>
+          <p:nvPr>
+            <p:extLst>
+              <p:ext uri="{386F3935-93C4-4BCD-93E2-E3B085C9AB24}">
+                <p16:designElem xmlns:p16="http://schemas.microsoft.com/office/powerpoint/2015/main" val="1"/>
+              </p:ext>
+            </p:extLst>
+          </p:nvPr>
+        </p:nvSpPr>
+        <p:spPr>
+          <a:xfrm>
+            <a:off x="0" y="0"/>
+            <a:ext cx="12192000" cy="6858000"/>
+          </a:xfrm>
+          <a:prstGeom prst="rect">
+            <a:avLst/>
+          </a:prstGeom>
+          <a:ln w="12700" cap="flat" cmpd="sng" algn="ctr">
+            <a:noFill/>
+            <a:prstDash val="solid"/>
+            <a:miter lim="800000"/>
+          </a:ln>
+          <a:effectLst/>
+          <a:extLst>
+            <a:ext uri="{91240B29-F687-4F45-9708-019B960494DF}">
+              <a14:hiddenLine xmlns:a14="http://schemas.microsoft.com/office/drawing/2010/main" w="12700" cap="flat" cmpd="sng" algn="ctr">
+                <a:solidFill>
+                  <a:schemeClr val="accent1">
+                    <a:shade val="15000"/>
+                  </a:schemeClr>
+                </a:solidFill>
+                <a:prstDash val="solid"/>
+                <a:miter lim="800000"/>
+              </a14:hiddenLine>
+            </a:ext>
+          </a:extLst>
+        </p:spPr>
+        <p:style>
+          <a:lnRef idx="2">
+            <a:schemeClr val="accent1">
+              <a:shade val="15000"/>
+            </a:schemeClr>
+          </a:lnRef>
+          <a:fillRef idx="1">
+            <a:schemeClr val="accent1"/>
+          </a:fillRef>
+          <a:effectRef idx="0">
+            <a:schemeClr val="accent1"/>
+          </a:effectRef>
+          <a:fontRef idx="minor">
+            <a:schemeClr val="lt1"/>
+          </a:fontRef>
+        </p:style>
+        <p:txBody>
+          <a:bodyPr rtlCol="0" anchor="ctr"/>
+          <a:lstStyle/>
+          <a:p>
+            <a:pPr algn="ctr"/>
+            <a:endParaRPr lang="en-US"/>
+          </a:p>
+        </p:txBody>
+      </p:sp>
+      <p:sp>
+        <p:nvSpPr>
+          <p:cNvPr id="8" name="Tekstvak 7">
+            <a:extLst>
+              <a:ext uri="{FF2B5EF4-FFF2-40B4-BE49-F238E27FC236}">
+                <a16:creationId xmlns:a16="http://schemas.microsoft.com/office/drawing/2014/main" id="{CFA4A596-EFA7-F4DF-044E-48E13C5B6C70}"/>
+              </a:ext>
+            </a:extLst>
+          </p:cNvPr>
+          <p:cNvSpPr txBox="1"/>
+          <p:nvPr/>
+        </p:nvSpPr>
+        <p:spPr>
+          <a:xfrm>
+            <a:off x="1735604" y="229893"/>
+            <a:ext cx="8203720" cy="732129"/>
+          </a:xfrm>
+          <a:prstGeom prst="rect">
+            <a:avLst/>
+          </a:prstGeom>
+        </p:spPr>
+        <p:txBody>
+          <a:bodyPr vert="horz" lIns="91440" tIns="45720" rIns="91440" bIns="45720" rtlCol="0" anchor="b">
+            <a:normAutofit/>
+          </a:bodyPr>
+          <a:lstStyle/>
+          <a:p>
+            <a:pPr algn="ctr">
+              <a:lnSpc>
+                <a:spcPct val="90000"/>
+              </a:lnSpc>
+              <a:spcBef>
+                <a:spcPct val="0"/>
+              </a:spcBef>
+              <a:spcAft>
+                <a:spcPts val="600"/>
+              </a:spcAft>
+            </a:pPr>
+            <a:r>
+              <a:rPr lang="en-US" sz="3600" b="1" dirty="0">
+                <a:latin typeface="+mj-lt"/>
+                <a:ea typeface="+mj-ea"/>
+                <a:cs typeface="+mj-cs"/>
+              </a:rPr>
+              <a:t>Debugging Tips</a:t>
+            </a:r>
+            <a:endParaRPr lang="nl-NL" dirty="0">
+              <a:ea typeface="+mj-ea"/>
+              <a:cs typeface="+mj-cs"/>
+            </a:endParaRPr>
+          </a:p>
+        </p:txBody>
+      </p:sp>
+      <p:sp>
+        <p:nvSpPr>
+          <p:cNvPr id="2" name="Tekstvak 1">
+            <a:extLst>
+              <a:ext uri="{FF2B5EF4-FFF2-40B4-BE49-F238E27FC236}">
+                <a16:creationId xmlns:a16="http://schemas.microsoft.com/office/drawing/2014/main" id="{F4A5CCB7-D045-ED25-5109-CB63CDB8A2CF}"/>
+              </a:ext>
+            </a:extLst>
+          </p:cNvPr>
+          <p:cNvSpPr txBox="1"/>
+          <p:nvPr/>
+        </p:nvSpPr>
+        <p:spPr>
+          <a:xfrm>
+            <a:off x="216477" y="1359477"/>
+            <a:ext cx="11386703" cy="923330"/>
+          </a:xfrm>
+          <a:prstGeom prst="rect">
+            <a:avLst/>
+          </a:prstGeom>
+          <a:noFill/>
+        </p:spPr>
+        <p:txBody>
+          <a:bodyPr rot="0" spcFirstLastPara="0" vertOverflow="overflow" horzOverflow="overflow" vert="horz" wrap="square" lIns="91440" tIns="45720" rIns="91440" bIns="45720" numCol="1" spcCol="0" rtlCol="0" fromWordArt="0" anchor="t" anchorCtr="0" forceAA="0" compatLnSpc="1">
+            <a:prstTxWarp prst="textNoShape">
+              <a:avLst/>
+            </a:prstTxWarp>
+            <a:spAutoFit/>
+          </a:bodyPr>
+          <a:lstStyle/>
+          <a:p>
+            <a:pPr marL="285750" indent="-285750">
+              <a:buFont typeface="Calibri"/>
+              <a:buChar char="-"/>
+            </a:pPr>
+            <a:r>
+              <a:rPr lang="nl-NL" dirty="0" err="1"/>
+              <a:t>Errors</a:t>
+            </a:r>
+            <a:r>
+              <a:rPr lang="nl-NL" dirty="0"/>
+              <a:t> komen als tekst op je website</a:t>
+            </a:r>
+          </a:p>
+          <a:p>
+            <a:pPr marL="285750" indent="-285750">
+              <a:buFont typeface="Calibri"/>
+              <a:buChar char="-"/>
+            </a:pPr>
+            <a:r>
+              <a:rPr lang="nl-NL" dirty="0"/>
+              <a:t>Als je wilt zien wat er in een array zit: gebruik "</a:t>
+            </a:r>
+            <a:r>
+              <a:rPr lang="nl-NL" dirty="0" err="1"/>
+              <a:t>print_r</a:t>
+            </a:r>
+            <a:r>
+              <a:rPr lang="nl-NL" dirty="0"/>
+              <a:t>($</a:t>
+            </a:r>
+            <a:r>
+              <a:rPr lang="nl-NL" dirty="0" err="1"/>
+              <a:t>array_variabele</a:t>
+            </a:r>
+            <a:r>
+              <a:rPr lang="nl-NL" dirty="0"/>
+              <a:t>)"</a:t>
+            </a:r>
+          </a:p>
+          <a:p>
+            <a:pPr marL="285750" indent="-285750">
+              <a:buFont typeface="Calibri"/>
+              <a:buChar char="-"/>
+            </a:pPr>
+            <a:r>
+              <a:rPr lang="nl-NL" dirty="0"/>
+              <a:t>Als je wilt zien wat er in een variabele zit: gebruik echo($var)</a:t>
+            </a:r>
+          </a:p>
+        </p:txBody>
+      </p:sp>
+    </p:spTree>
+    <p:extLst>
+      <p:ext uri="{BB962C8B-B14F-4D97-AF65-F5344CB8AC3E}">
+        <p14:creationId xmlns:p14="http://schemas.microsoft.com/office/powerpoint/2010/main" val="1983019423"/>
+      </p:ext>
+    </p:extLst>
+  </p:cSld>
+  <p:clrMapOvr>
+    <a:masterClrMapping/>
+  </p:clrMapOvr>
+</p:sld>
+</file>
+
+<file path=ppt/slides/slide26.xml><?xml version="1.0" encoding="utf-8"?>
+<p:sld xmlns:a="http://schemas.openxmlformats.org/drawingml/2006/main" xmlns:r="http://schemas.openxmlformats.org/officeDocument/2006/relationships" xmlns:p="http://schemas.openxmlformats.org/presentationml/2006/main">
+  <p:cSld>
+    <p:bg>
+      <p:bgPr>
+        <a:solidFill>
+          <a:schemeClr val="bg1"/>
+        </a:solidFill>
+        <a:effectLst/>
+      </p:bgPr>
+    </p:bg>
+    <p:spTree>
+      <p:nvGrpSpPr>
+        <p:cNvPr id="1" name="">
+          <a:extLst>
+            <a:ext uri="{FF2B5EF4-FFF2-40B4-BE49-F238E27FC236}">
               <a16:creationId xmlns:a16="http://schemas.microsoft.com/office/drawing/2014/main" id="{A074D649-B5B8-7C2D-5561-327D26CA695B}"/>
             </a:ext>
           </a:extLst>
@@ -17837,7 +18222,7 @@
 </p:sld>
 </file>
 
-<file path=ppt/slides/slide26.xml><?xml version="1.0" encoding="utf-8"?>
+<file path=ppt/slides/slide27.xml><?xml version="1.0" encoding="utf-8"?>
 <p:sld xmlns:a="http://schemas.openxmlformats.org/drawingml/2006/main" xmlns:r="http://schemas.openxmlformats.org/officeDocument/2006/relationships" xmlns:p="http://schemas.openxmlformats.org/presentationml/2006/main">
   <p:cSld>
     <p:bg>

</xml_diff>